<commit_message>
Update about prolib CRC computation
</commit_message>
<xml_diff>
--- a/openedge/prolib/prolib.pptx
+++ b/openedge/prolib/prolib.pptx
@@ -7,6 +7,8 @@
   <p:sldIdLst>
     <p:sldId id="256" r:id="rId2"/>
     <p:sldId id="257" r:id="rId3"/>
+    <p:sldId id="258" r:id="rId4"/>
+    <p:sldId id="259" r:id="rId5"/>
   </p:sldIdLst>
   <p:sldSz cx="12192000" cy="6858000"/>
   <p:notesSz cx="6858000" cy="9144000"/>
@@ -155,7 +157,7 @@
           </a:lstStyle>
           <a:p>
             <a:r>
-              <a:rPr lang="en-US" smtClean="0"/>
+              <a:rPr lang="en-US"/>
               <a:t>Click to edit Master title style</a:t>
             </a:r>
             <a:endParaRPr lang="fr-FR"/>
@@ -220,7 +222,7 @@
           </a:lstStyle>
           <a:p>
             <a:r>
-              <a:rPr lang="en-US" smtClean="0"/>
+              <a:rPr lang="en-US"/>
               <a:t>Click to edit Master subtitle style</a:t>
             </a:r>
             <a:endParaRPr lang="fr-FR"/>
@@ -244,7 +246,7 @@
           <a:p>
             <a:fld id="{EDB9525B-764E-41CE-B697-8DFC4A4E3F96}" type="datetimeFigureOut">
               <a:rPr lang="fr-FR" smtClean="0"/>
-              <a:t>26/10/2018</a:t>
+              <a:t>29/10/2018</a:t>
             </a:fld>
             <a:endParaRPr lang="fr-FR"/>
           </a:p>
@@ -286,7 +288,7 @@
           <a:p>
             <a:fld id="{B0AA3ED8-F09F-4DE6-9578-9F7A07A45820}" type="slidenum">
               <a:rPr lang="fr-FR" smtClean="0"/>
-              <a:t>‹#›</a:t>
+              <a:t>‹N°›</a:t>
             </a:fld>
             <a:endParaRPr lang="fr-FR"/>
           </a:p>
@@ -338,7 +340,7 @@
           <a:lstStyle/>
           <a:p>
             <a:r>
-              <a:rPr lang="en-US" smtClean="0"/>
+              <a:rPr lang="en-US"/>
               <a:t>Click to edit Master title style</a:t>
             </a:r>
             <a:endParaRPr lang="fr-FR"/>
@@ -362,35 +364,35 @@
           <a:p>
             <a:pPr lvl="0"/>
             <a:r>
-              <a:rPr lang="en-US" smtClean="0"/>
+              <a:rPr lang="en-US"/>
               <a:t>Edit Master text styles</a:t>
             </a:r>
           </a:p>
           <a:p>
             <a:pPr lvl="1"/>
             <a:r>
-              <a:rPr lang="en-US" smtClean="0"/>
+              <a:rPr lang="en-US"/>
               <a:t>Second level</a:t>
             </a:r>
           </a:p>
           <a:p>
             <a:pPr lvl="2"/>
             <a:r>
-              <a:rPr lang="en-US" smtClean="0"/>
+              <a:rPr lang="en-US"/>
               <a:t>Third level</a:t>
             </a:r>
           </a:p>
           <a:p>
             <a:pPr lvl="3"/>
             <a:r>
-              <a:rPr lang="en-US" smtClean="0"/>
+              <a:rPr lang="en-US"/>
               <a:t>Fourth level</a:t>
             </a:r>
           </a:p>
           <a:p>
             <a:pPr lvl="4"/>
             <a:r>
-              <a:rPr lang="en-US" smtClean="0"/>
+              <a:rPr lang="en-US"/>
               <a:t>Fifth level</a:t>
             </a:r>
             <a:endParaRPr lang="fr-FR"/>
@@ -414,7 +416,7 @@
           <a:p>
             <a:fld id="{EDB9525B-764E-41CE-B697-8DFC4A4E3F96}" type="datetimeFigureOut">
               <a:rPr lang="fr-FR" smtClean="0"/>
-              <a:t>26/10/2018</a:t>
+              <a:t>29/10/2018</a:t>
             </a:fld>
             <a:endParaRPr lang="fr-FR"/>
           </a:p>
@@ -456,7 +458,7 @@
           <a:p>
             <a:fld id="{B0AA3ED8-F09F-4DE6-9578-9F7A07A45820}" type="slidenum">
               <a:rPr lang="fr-FR" smtClean="0"/>
-              <a:t>‹#›</a:t>
+              <a:t>‹N°›</a:t>
             </a:fld>
             <a:endParaRPr lang="fr-FR"/>
           </a:p>
@@ -513,7 +515,7 @@
           <a:lstStyle/>
           <a:p>
             <a:r>
-              <a:rPr lang="en-US" smtClean="0"/>
+              <a:rPr lang="en-US"/>
               <a:t>Click to edit Master title style</a:t>
             </a:r>
             <a:endParaRPr lang="fr-FR"/>
@@ -542,35 +544,35 @@
           <a:p>
             <a:pPr lvl="0"/>
             <a:r>
-              <a:rPr lang="en-US" smtClean="0"/>
+              <a:rPr lang="en-US"/>
               <a:t>Edit Master text styles</a:t>
             </a:r>
           </a:p>
           <a:p>
             <a:pPr lvl="1"/>
             <a:r>
-              <a:rPr lang="en-US" smtClean="0"/>
+              <a:rPr lang="en-US"/>
               <a:t>Second level</a:t>
             </a:r>
           </a:p>
           <a:p>
             <a:pPr lvl="2"/>
             <a:r>
-              <a:rPr lang="en-US" smtClean="0"/>
+              <a:rPr lang="en-US"/>
               <a:t>Third level</a:t>
             </a:r>
           </a:p>
           <a:p>
             <a:pPr lvl="3"/>
             <a:r>
-              <a:rPr lang="en-US" smtClean="0"/>
+              <a:rPr lang="en-US"/>
               <a:t>Fourth level</a:t>
             </a:r>
           </a:p>
           <a:p>
             <a:pPr lvl="4"/>
             <a:r>
-              <a:rPr lang="en-US" smtClean="0"/>
+              <a:rPr lang="en-US"/>
               <a:t>Fifth level</a:t>
             </a:r>
             <a:endParaRPr lang="fr-FR"/>
@@ -594,7 +596,7 @@
           <a:p>
             <a:fld id="{EDB9525B-764E-41CE-B697-8DFC4A4E3F96}" type="datetimeFigureOut">
               <a:rPr lang="fr-FR" smtClean="0"/>
-              <a:t>26/10/2018</a:t>
+              <a:t>29/10/2018</a:t>
             </a:fld>
             <a:endParaRPr lang="fr-FR"/>
           </a:p>
@@ -636,7 +638,7 @@
           <a:p>
             <a:fld id="{B0AA3ED8-F09F-4DE6-9578-9F7A07A45820}" type="slidenum">
               <a:rPr lang="fr-FR" smtClean="0"/>
-              <a:t>‹#›</a:t>
+              <a:t>‹N°›</a:t>
             </a:fld>
             <a:endParaRPr lang="fr-FR"/>
           </a:p>
@@ -688,7 +690,7 @@
           <a:lstStyle/>
           <a:p>
             <a:r>
-              <a:rPr lang="en-US" smtClean="0"/>
+              <a:rPr lang="en-US"/>
               <a:t>Click to edit Master title style</a:t>
             </a:r>
             <a:endParaRPr lang="fr-FR"/>
@@ -712,35 +714,35 @@
           <a:p>
             <a:pPr lvl="0"/>
             <a:r>
-              <a:rPr lang="en-US" smtClean="0"/>
+              <a:rPr lang="en-US"/>
               <a:t>Edit Master text styles</a:t>
             </a:r>
           </a:p>
           <a:p>
             <a:pPr lvl="1"/>
             <a:r>
-              <a:rPr lang="en-US" smtClean="0"/>
+              <a:rPr lang="en-US"/>
               <a:t>Second level</a:t>
             </a:r>
           </a:p>
           <a:p>
             <a:pPr lvl="2"/>
             <a:r>
-              <a:rPr lang="en-US" smtClean="0"/>
+              <a:rPr lang="en-US"/>
               <a:t>Third level</a:t>
             </a:r>
           </a:p>
           <a:p>
             <a:pPr lvl="3"/>
             <a:r>
-              <a:rPr lang="en-US" smtClean="0"/>
+              <a:rPr lang="en-US"/>
               <a:t>Fourth level</a:t>
             </a:r>
           </a:p>
           <a:p>
             <a:pPr lvl="4"/>
             <a:r>
-              <a:rPr lang="en-US" smtClean="0"/>
+              <a:rPr lang="en-US"/>
               <a:t>Fifth level</a:t>
             </a:r>
             <a:endParaRPr lang="fr-FR"/>
@@ -764,7 +766,7 @@
           <a:p>
             <a:fld id="{EDB9525B-764E-41CE-B697-8DFC4A4E3F96}" type="datetimeFigureOut">
               <a:rPr lang="fr-FR" smtClean="0"/>
-              <a:t>26/10/2018</a:t>
+              <a:t>29/10/2018</a:t>
             </a:fld>
             <a:endParaRPr lang="fr-FR"/>
           </a:p>
@@ -806,7 +808,7 @@
           <a:p>
             <a:fld id="{B0AA3ED8-F09F-4DE6-9578-9F7A07A45820}" type="slidenum">
               <a:rPr lang="fr-FR" smtClean="0"/>
-              <a:t>‹#›</a:t>
+              <a:t>‹N°›</a:t>
             </a:fld>
             <a:endParaRPr lang="fr-FR"/>
           </a:p>
@@ -867,7 +869,7 @@
           </a:lstStyle>
           <a:p>
             <a:r>
-              <a:rPr lang="en-US" smtClean="0"/>
+              <a:rPr lang="en-US"/>
               <a:t>Click to edit Master title style</a:t>
             </a:r>
             <a:endParaRPr lang="fr-FR"/>
@@ -987,7 +989,7 @@
           <a:p>
             <a:pPr lvl="0"/>
             <a:r>
-              <a:rPr lang="en-US" smtClean="0"/>
+              <a:rPr lang="en-US"/>
               <a:t>Edit Master text styles</a:t>
             </a:r>
           </a:p>
@@ -1010,7 +1012,7 @@
           <a:p>
             <a:fld id="{EDB9525B-764E-41CE-B697-8DFC4A4E3F96}" type="datetimeFigureOut">
               <a:rPr lang="fr-FR" smtClean="0"/>
-              <a:t>26/10/2018</a:t>
+              <a:t>29/10/2018</a:t>
             </a:fld>
             <a:endParaRPr lang="fr-FR"/>
           </a:p>
@@ -1052,7 +1054,7 @@
           <a:p>
             <a:fld id="{B0AA3ED8-F09F-4DE6-9578-9F7A07A45820}" type="slidenum">
               <a:rPr lang="fr-FR" smtClean="0"/>
-              <a:t>‹#›</a:t>
+              <a:t>‹N°›</a:t>
             </a:fld>
             <a:endParaRPr lang="fr-FR"/>
           </a:p>
@@ -1104,7 +1106,7 @@
           <a:lstStyle/>
           <a:p>
             <a:r>
-              <a:rPr lang="en-US" smtClean="0"/>
+              <a:rPr lang="en-US"/>
               <a:t>Click to edit Master title style</a:t>
             </a:r>
             <a:endParaRPr lang="fr-FR"/>
@@ -1133,35 +1135,35 @@
           <a:p>
             <a:pPr lvl="0"/>
             <a:r>
-              <a:rPr lang="en-US" smtClean="0"/>
+              <a:rPr lang="en-US"/>
               <a:t>Edit Master text styles</a:t>
             </a:r>
           </a:p>
           <a:p>
             <a:pPr lvl="1"/>
             <a:r>
-              <a:rPr lang="en-US" smtClean="0"/>
+              <a:rPr lang="en-US"/>
               <a:t>Second level</a:t>
             </a:r>
           </a:p>
           <a:p>
             <a:pPr lvl="2"/>
             <a:r>
-              <a:rPr lang="en-US" smtClean="0"/>
+              <a:rPr lang="en-US"/>
               <a:t>Third level</a:t>
             </a:r>
           </a:p>
           <a:p>
             <a:pPr lvl="3"/>
             <a:r>
-              <a:rPr lang="en-US" smtClean="0"/>
+              <a:rPr lang="en-US"/>
               <a:t>Fourth level</a:t>
             </a:r>
           </a:p>
           <a:p>
             <a:pPr lvl="4"/>
             <a:r>
-              <a:rPr lang="en-US" smtClean="0"/>
+              <a:rPr lang="en-US"/>
               <a:t>Fifth level</a:t>
             </a:r>
             <a:endParaRPr lang="fr-FR"/>
@@ -1190,35 +1192,35 @@
           <a:p>
             <a:pPr lvl="0"/>
             <a:r>
-              <a:rPr lang="en-US" smtClean="0"/>
+              <a:rPr lang="en-US"/>
               <a:t>Edit Master text styles</a:t>
             </a:r>
           </a:p>
           <a:p>
             <a:pPr lvl="1"/>
             <a:r>
-              <a:rPr lang="en-US" smtClean="0"/>
+              <a:rPr lang="en-US"/>
               <a:t>Second level</a:t>
             </a:r>
           </a:p>
           <a:p>
             <a:pPr lvl="2"/>
             <a:r>
-              <a:rPr lang="en-US" smtClean="0"/>
+              <a:rPr lang="en-US"/>
               <a:t>Third level</a:t>
             </a:r>
           </a:p>
           <a:p>
             <a:pPr lvl="3"/>
             <a:r>
-              <a:rPr lang="en-US" smtClean="0"/>
+              <a:rPr lang="en-US"/>
               <a:t>Fourth level</a:t>
             </a:r>
           </a:p>
           <a:p>
             <a:pPr lvl="4"/>
             <a:r>
-              <a:rPr lang="en-US" smtClean="0"/>
+              <a:rPr lang="en-US"/>
               <a:t>Fifth level</a:t>
             </a:r>
             <a:endParaRPr lang="fr-FR"/>
@@ -1242,7 +1244,7 @@
           <a:p>
             <a:fld id="{EDB9525B-764E-41CE-B697-8DFC4A4E3F96}" type="datetimeFigureOut">
               <a:rPr lang="fr-FR" smtClean="0"/>
-              <a:t>26/10/2018</a:t>
+              <a:t>29/10/2018</a:t>
             </a:fld>
             <a:endParaRPr lang="fr-FR"/>
           </a:p>
@@ -1284,7 +1286,7 @@
           <a:p>
             <a:fld id="{B0AA3ED8-F09F-4DE6-9578-9F7A07A45820}" type="slidenum">
               <a:rPr lang="fr-FR" smtClean="0"/>
-              <a:t>‹#›</a:t>
+              <a:t>‹N°›</a:t>
             </a:fld>
             <a:endParaRPr lang="fr-FR"/>
           </a:p>
@@ -1341,7 +1343,7 @@
           <a:lstStyle/>
           <a:p>
             <a:r>
-              <a:rPr lang="en-US" smtClean="0"/>
+              <a:rPr lang="en-US"/>
               <a:t>Click to edit Master title style</a:t>
             </a:r>
             <a:endParaRPr lang="fr-FR"/>
@@ -1407,7 +1409,7 @@
           <a:p>
             <a:pPr lvl="0"/>
             <a:r>
-              <a:rPr lang="en-US" smtClean="0"/>
+              <a:rPr lang="en-US"/>
               <a:t>Edit Master text styles</a:t>
             </a:r>
           </a:p>
@@ -1435,35 +1437,35 @@
           <a:p>
             <a:pPr lvl="0"/>
             <a:r>
-              <a:rPr lang="en-US" smtClean="0"/>
+              <a:rPr lang="en-US"/>
               <a:t>Edit Master text styles</a:t>
             </a:r>
           </a:p>
           <a:p>
             <a:pPr lvl="1"/>
             <a:r>
-              <a:rPr lang="en-US" smtClean="0"/>
+              <a:rPr lang="en-US"/>
               <a:t>Second level</a:t>
             </a:r>
           </a:p>
           <a:p>
             <a:pPr lvl="2"/>
             <a:r>
-              <a:rPr lang="en-US" smtClean="0"/>
+              <a:rPr lang="en-US"/>
               <a:t>Third level</a:t>
             </a:r>
           </a:p>
           <a:p>
             <a:pPr lvl="3"/>
             <a:r>
-              <a:rPr lang="en-US" smtClean="0"/>
+              <a:rPr lang="en-US"/>
               <a:t>Fourth level</a:t>
             </a:r>
           </a:p>
           <a:p>
             <a:pPr lvl="4"/>
             <a:r>
-              <a:rPr lang="en-US" smtClean="0"/>
+              <a:rPr lang="en-US"/>
               <a:t>Fifth level</a:t>
             </a:r>
             <a:endParaRPr lang="fr-FR"/>
@@ -1529,7 +1531,7 @@
           <a:p>
             <a:pPr lvl="0"/>
             <a:r>
-              <a:rPr lang="en-US" smtClean="0"/>
+              <a:rPr lang="en-US"/>
               <a:t>Edit Master text styles</a:t>
             </a:r>
           </a:p>
@@ -1557,35 +1559,35 @@
           <a:p>
             <a:pPr lvl="0"/>
             <a:r>
-              <a:rPr lang="en-US" smtClean="0"/>
+              <a:rPr lang="en-US"/>
               <a:t>Edit Master text styles</a:t>
             </a:r>
           </a:p>
           <a:p>
             <a:pPr lvl="1"/>
             <a:r>
-              <a:rPr lang="en-US" smtClean="0"/>
+              <a:rPr lang="en-US"/>
               <a:t>Second level</a:t>
             </a:r>
           </a:p>
           <a:p>
             <a:pPr lvl="2"/>
             <a:r>
-              <a:rPr lang="en-US" smtClean="0"/>
+              <a:rPr lang="en-US"/>
               <a:t>Third level</a:t>
             </a:r>
           </a:p>
           <a:p>
             <a:pPr lvl="3"/>
             <a:r>
-              <a:rPr lang="en-US" smtClean="0"/>
+              <a:rPr lang="en-US"/>
               <a:t>Fourth level</a:t>
             </a:r>
           </a:p>
           <a:p>
             <a:pPr lvl="4"/>
             <a:r>
-              <a:rPr lang="en-US" smtClean="0"/>
+              <a:rPr lang="en-US"/>
               <a:t>Fifth level</a:t>
             </a:r>
             <a:endParaRPr lang="fr-FR"/>
@@ -1609,7 +1611,7 @@
           <a:p>
             <a:fld id="{EDB9525B-764E-41CE-B697-8DFC4A4E3F96}" type="datetimeFigureOut">
               <a:rPr lang="fr-FR" smtClean="0"/>
-              <a:t>26/10/2018</a:t>
+              <a:t>29/10/2018</a:t>
             </a:fld>
             <a:endParaRPr lang="fr-FR"/>
           </a:p>
@@ -1651,7 +1653,7 @@
           <a:p>
             <a:fld id="{B0AA3ED8-F09F-4DE6-9578-9F7A07A45820}" type="slidenum">
               <a:rPr lang="fr-FR" smtClean="0"/>
-              <a:t>‹#›</a:t>
+              <a:t>‹N°›</a:t>
             </a:fld>
             <a:endParaRPr lang="fr-FR"/>
           </a:p>
@@ -1703,7 +1705,7 @@
           <a:lstStyle/>
           <a:p>
             <a:r>
-              <a:rPr lang="en-US" smtClean="0"/>
+              <a:rPr lang="en-US"/>
               <a:t>Click to edit Master title style</a:t>
             </a:r>
             <a:endParaRPr lang="fr-FR"/>
@@ -1727,7 +1729,7 @@
           <a:p>
             <a:fld id="{EDB9525B-764E-41CE-B697-8DFC4A4E3F96}" type="datetimeFigureOut">
               <a:rPr lang="fr-FR" smtClean="0"/>
-              <a:t>26/10/2018</a:t>
+              <a:t>29/10/2018</a:t>
             </a:fld>
             <a:endParaRPr lang="fr-FR"/>
           </a:p>
@@ -1769,7 +1771,7 @@
           <a:p>
             <a:fld id="{B0AA3ED8-F09F-4DE6-9578-9F7A07A45820}" type="slidenum">
               <a:rPr lang="fr-FR" smtClean="0"/>
-              <a:t>‹#›</a:t>
+              <a:t>‹N°›</a:t>
             </a:fld>
             <a:endParaRPr lang="fr-FR"/>
           </a:p>
@@ -1822,7 +1824,7 @@
           <a:p>
             <a:fld id="{EDB9525B-764E-41CE-B697-8DFC4A4E3F96}" type="datetimeFigureOut">
               <a:rPr lang="fr-FR" smtClean="0"/>
-              <a:t>26/10/2018</a:t>
+              <a:t>29/10/2018</a:t>
             </a:fld>
             <a:endParaRPr lang="fr-FR"/>
           </a:p>
@@ -1864,7 +1866,7 @@
           <a:p>
             <a:fld id="{B0AA3ED8-F09F-4DE6-9578-9F7A07A45820}" type="slidenum">
               <a:rPr lang="fr-FR" smtClean="0"/>
-              <a:t>‹#›</a:t>
+              <a:t>‹N°›</a:t>
             </a:fld>
             <a:endParaRPr lang="fr-FR"/>
           </a:p>
@@ -1925,7 +1927,7 @@
           </a:lstStyle>
           <a:p>
             <a:r>
-              <a:rPr lang="en-US" smtClean="0"/>
+              <a:rPr lang="en-US"/>
               <a:t>Click to edit Master title style</a:t>
             </a:r>
             <a:endParaRPr lang="fr-FR"/>
@@ -1982,35 +1984,35 @@
           <a:p>
             <a:pPr lvl="0"/>
             <a:r>
-              <a:rPr lang="en-US" smtClean="0"/>
+              <a:rPr lang="en-US"/>
               <a:t>Edit Master text styles</a:t>
             </a:r>
           </a:p>
           <a:p>
             <a:pPr lvl="1"/>
             <a:r>
-              <a:rPr lang="en-US" smtClean="0"/>
+              <a:rPr lang="en-US"/>
               <a:t>Second level</a:t>
             </a:r>
           </a:p>
           <a:p>
             <a:pPr lvl="2"/>
             <a:r>
-              <a:rPr lang="en-US" smtClean="0"/>
+              <a:rPr lang="en-US"/>
               <a:t>Third level</a:t>
             </a:r>
           </a:p>
           <a:p>
             <a:pPr lvl="3"/>
             <a:r>
-              <a:rPr lang="en-US" smtClean="0"/>
+              <a:rPr lang="en-US"/>
               <a:t>Fourth level</a:t>
             </a:r>
           </a:p>
           <a:p>
             <a:pPr lvl="4"/>
             <a:r>
-              <a:rPr lang="en-US" smtClean="0"/>
+              <a:rPr lang="en-US"/>
               <a:t>Fifth level</a:t>
             </a:r>
             <a:endParaRPr lang="fr-FR"/>
@@ -2076,7 +2078,7 @@
           <a:p>
             <a:pPr lvl="0"/>
             <a:r>
-              <a:rPr lang="en-US" smtClean="0"/>
+              <a:rPr lang="en-US"/>
               <a:t>Edit Master text styles</a:t>
             </a:r>
           </a:p>
@@ -2099,7 +2101,7 @@
           <a:p>
             <a:fld id="{EDB9525B-764E-41CE-B697-8DFC4A4E3F96}" type="datetimeFigureOut">
               <a:rPr lang="fr-FR" smtClean="0"/>
-              <a:t>26/10/2018</a:t>
+              <a:t>29/10/2018</a:t>
             </a:fld>
             <a:endParaRPr lang="fr-FR"/>
           </a:p>
@@ -2141,7 +2143,7 @@
           <a:p>
             <a:fld id="{B0AA3ED8-F09F-4DE6-9578-9F7A07A45820}" type="slidenum">
               <a:rPr lang="fr-FR" smtClean="0"/>
-              <a:t>‹#›</a:t>
+              <a:t>‹N°›</a:t>
             </a:fld>
             <a:endParaRPr lang="fr-FR"/>
           </a:p>
@@ -2202,7 +2204,7 @@
           </a:lstStyle>
           <a:p>
             <a:r>
-              <a:rPr lang="en-US" smtClean="0"/>
+              <a:rPr lang="en-US"/>
               <a:t>Click to edit Master title style</a:t>
             </a:r>
             <a:endParaRPr lang="fr-FR"/>
@@ -2329,7 +2331,7 @@
           <a:p>
             <a:pPr lvl="0"/>
             <a:r>
-              <a:rPr lang="en-US" smtClean="0"/>
+              <a:rPr lang="en-US"/>
               <a:t>Edit Master text styles</a:t>
             </a:r>
           </a:p>
@@ -2352,7 +2354,7 @@
           <a:p>
             <a:fld id="{EDB9525B-764E-41CE-B697-8DFC4A4E3F96}" type="datetimeFigureOut">
               <a:rPr lang="fr-FR" smtClean="0"/>
-              <a:t>26/10/2018</a:t>
+              <a:t>29/10/2018</a:t>
             </a:fld>
             <a:endParaRPr lang="fr-FR"/>
           </a:p>
@@ -2394,7 +2396,7 @@
           <a:p>
             <a:fld id="{B0AA3ED8-F09F-4DE6-9578-9F7A07A45820}" type="slidenum">
               <a:rPr lang="fr-FR" smtClean="0"/>
-              <a:t>‹#›</a:t>
+              <a:t>‹N°›</a:t>
             </a:fld>
             <a:endParaRPr lang="fr-FR"/>
           </a:p>
@@ -2461,7 +2463,7 @@
           <a:lstStyle/>
           <a:p>
             <a:r>
-              <a:rPr lang="en-US" smtClean="0"/>
+              <a:rPr lang="en-US"/>
               <a:t>Click to edit Master title style</a:t>
             </a:r>
             <a:endParaRPr lang="fr-FR"/>
@@ -2495,35 +2497,35 @@
           <a:p>
             <a:pPr lvl="0"/>
             <a:r>
-              <a:rPr lang="en-US" smtClean="0"/>
+              <a:rPr lang="en-US"/>
               <a:t>Edit Master text styles</a:t>
             </a:r>
           </a:p>
           <a:p>
             <a:pPr lvl="1"/>
             <a:r>
-              <a:rPr lang="en-US" smtClean="0"/>
+              <a:rPr lang="en-US"/>
               <a:t>Second level</a:t>
             </a:r>
           </a:p>
           <a:p>
             <a:pPr lvl="2"/>
             <a:r>
-              <a:rPr lang="en-US" smtClean="0"/>
+              <a:rPr lang="en-US"/>
               <a:t>Third level</a:t>
             </a:r>
           </a:p>
           <a:p>
             <a:pPr lvl="3"/>
             <a:r>
-              <a:rPr lang="en-US" smtClean="0"/>
+              <a:rPr lang="en-US"/>
               <a:t>Fourth level</a:t>
             </a:r>
           </a:p>
           <a:p>
             <a:pPr lvl="4"/>
             <a:r>
-              <a:rPr lang="en-US" smtClean="0"/>
+              <a:rPr lang="en-US"/>
               <a:t>Fifth level</a:t>
             </a:r>
             <a:endParaRPr lang="fr-FR"/>
@@ -2565,7 +2567,7 @@
           <a:p>
             <a:fld id="{EDB9525B-764E-41CE-B697-8DFC4A4E3F96}" type="datetimeFigureOut">
               <a:rPr lang="fr-FR" smtClean="0"/>
-              <a:t>26/10/2018</a:t>
+              <a:t>29/10/2018</a:t>
             </a:fld>
             <a:endParaRPr lang="fr-FR"/>
           </a:p>
@@ -2643,7 +2645,7 @@
           <a:p>
             <a:fld id="{B0AA3ED8-F09F-4DE6-9578-9F7A07A45820}" type="slidenum">
               <a:rPr lang="fr-FR" smtClean="0"/>
-              <a:t>‹#›</a:t>
+              <a:t>‹N°›</a:t>
             </a:fld>
             <a:endParaRPr lang="fr-FR"/>
           </a:p>
@@ -3213,7 +3215,7 @@
           <a:lstStyle/>
           <a:p>
             <a:r>
-              <a:rPr lang="en-GB" sz="1050" dirty="0" smtClean="0">
+              <a:rPr lang="en-GB" sz="1050" dirty="0">
                 <a:solidFill>
                   <a:srgbClr val="FF0000"/>
                 </a:solidFill>
@@ -3329,7 +3331,7 @@
           <a:lstStyle/>
           <a:p>
             <a:r>
-              <a:rPr lang="en-GB" sz="1050" dirty="0" smtClean="0">
+              <a:rPr lang="en-GB" sz="1050" dirty="0">
                 <a:solidFill>
                   <a:srgbClr val="00B050"/>
                 </a:solidFill>
@@ -3413,7 +3415,7 @@
           <a:lstStyle/>
           <a:p>
             <a:r>
-              <a:rPr lang="en-GB" sz="1050" dirty="0" smtClean="0">
+              <a:rPr lang="en-GB" sz="1050" dirty="0">
                 <a:solidFill>
                   <a:srgbClr val="EEB500"/>
                 </a:solidFill>
@@ -3533,7 +3535,7 @@
           <a:lstStyle/>
           <a:p>
             <a:r>
-              <a:rPr lang="en-GB" sz="1050" dirty="0" smtClean="0">
+              <a:rPr lang="en-GB" sz="1050" dirty="0">
                 <a:solidFill>
                   <a:srgbClr val="00B0F0"/>
                 </a:solidFill>
@@ -3699,7 +3701,7 @@
           <a:lstStyle/>
           <a:p>
             <a:r>
-              <a:rPr lang="en-GB" sz="1050" dirty="0" smtClean="0">
+              <a:rPr lang="en-GB" sz="1050" dirty="0">
                 <a:solidFill>
                   <a:schemeClr val="accent1">
                     <a:lumMod val="75000"/>
@@ -3787,7 +3789,7 @@
           <a:lstStyle/>
           <a:p>
             <a:r>
-              <a:rPr lang="en-GB" sz="1050" dirty="0" smtClean="0">
+              <a:rPr lang="en-GB" sz="1050" dirty="0">
                 <a:solidFill>
                   <a:srgbClr val="FF0000"/>
                 </a:solidFill>
@@ -3959,7 +3961,7 @@
           <a:lstStyle/>
           <a:p>
             <a:r>
-              <a:rPr lang="en-GB" sz="1050" dirty="0" smtClean="0">
+              <a:rPr lang="en-GB" sz="1050" dirty="0">
                 <a:solidFill>
                   <a:srgbClr val="7030A0"/>
                 </a:solidFill>
@@ -3969,7 +3971,7 @@
           </a:p>
           <a:p>
             <a:r>
-              <a:rPr lang="en-GB" sz="1050" dirty="0" smtClean="0">
+              <a:rPr lang="en-GB" sz="1050" dirty="0">
                 <a:solidFill>
                   <a:srgbClr val="7030A0"/>
                 </a:solidFill>
@@ -4007,7 +4009,7 @@
           <a:lstStyle/>
           <a:p>
             <a:r>
-              <a:rPr lang="en-GB" sz="1050" dirty="0" smtClean="0">
+              <a:rPr lang="en-GB" sz="1050" dirty="0">
                 <a:solidFill>
                   <a:srgbClr val="FFC000"/>
                 </a:solidFill>
@@ -4169,7 +4171,7 @@
           <a:lstStyle/>
           <a:p>
             <a:r>
-              <a:rPr lang="en-GB" sz="1050" dirty="0" smtClean="0">
+              <a:rPr lang="en-GB" sz="1050" dirty="0">
                 <a:solidFill>
                   <a:srgbClr val="00B0F0"/>
                 </a:solidFill>
@@ -4177,7 +4179,7 @@
               <a:t>The file path (max </a:t>
             </a:r>
             <a:r>
-              <a:rPr lang="en-GB" sz="1050" dirty="0" err="1" smtClean="0">
+              <a:rPr lang="en-GB" sz="1050" dirty="0" err="1">
                 <a:solidFill>
                   <a:srgbClr val="00B0F0"/>
                 </a:solidFill>
@@ -4185,7 +4187,7 @@
               <a:t>lgt</a:t>
             </a:r>
             <a:r>
-              <a:rPr lang="en-GB" sz="1050" dirty="0" smtClean="0">
+              <a:rPr lang="en-GB" sz="1050" dirty="0">
                 <a:solidFill>
                   <a:srgbClr val="00B0F0"/>
                 </a:solidFill>
@@ -4399,7 +4401,7 @@
           <a:lstStyle/>
           <a:p>
             <a:r>
-              <a:rPr lang="en-GB" sz="1050" dirty="0" smtClean="0">
+              <a:rPr lang="en-GB" sz="1050" dirty="0">
                 <a:solidFill>
                   <a:schemeClr val="accent1">
                     <a:lumMod val="75000"/>
@@ -4487,7 +4489,7 @@
           <a:lstStyle/>
           <a:p>
             <a:r>
-              <a:rPr lang="en-GB" sz="1050" dirty="0" smtClean="0">
+              <a:rPr lang="en-GB" sz="1050" dirty="0">
                 <a:solidFill>
                   <a:srgbClr val="FF0000"/>
                 </a:solidFill>
@@ -4614,20 +4616,12 @@
           <a:lstStyle/>
           <a:p>
             <a:r>
-              <a:rPr lang="en-GB" sz="1050" dirty="0" smtClean="0">
+              <a:rPr lang="en-GB" sz="1050" dirty="0">
                 <a:solidFill>
                   <a:srgbClr val="00B050"/>
                 </a:solidFill>
               </a:rPr>
-              <a:t>Uint32:File </a:t>
-            </a:r>
-            <a:r>
-              <a:rPr lang="en-GB" sz="1050" dirty="0" smtClean="0">
-                <a:solidFill>
-                  <a:srgbClr val="00B050"/>
-                </a:solidFill>
-              </a:rPr>
-              <a:t>size</a:t>
+              <a:t>Uint32:File size</a:t>
             </a:r>
             <a:endParaRPr lang="fr-FR" sz="1050" dirty="0">
               <a:solidFill>
@@ -4791,7 +4785,7 @@
           <a:lstStyle/>
           <a:p>
             <a:r>
-              <a:rPr lang="en-GB" sz="1050" dirty="0" smtClean="0">
+              <a:rPr lang="en-GB" sz="1050" dirty="0">
                 <a:solidFill>
                   <a:srgbClr val="EEB500"/>
                 </a:solidFill>
@@ -4829,7 +4823,7 @@
           <a:lstStyle/>
           <a:p>
             <a:r>
-              <a:rPr lang="en-GB" sz="1050" dirty="0" smtClean="0">
+              <a:rPr lang="en-GB" sz="1050" dirty="0">
                 <a:solidFill>
                   <a:srgbClr val="00B0F0"/>
                 </a:solidFill>
@@ -5622,7 +5616,7 @@
           <a:lstStyle/>
           <a:p>
             <a:r>
-              <a:rPr lang="en-GB" sz="1050" b="1" dirty="0" smtClean="0"/>
+              <a:rPr lang="en-GB" sz="1050" b="1" dirty="0"/>
               <a:t>24 null bytes</a:t>
             </a:r>
             <a:endParaRPr lang="fr-FR" sz="1050" b="1" dirty="0"/>
@@ -5652,7 +5646,7 @@
           <a:lstStyle/>
           <a:p>
             <a:r>
-              <a:rPr lang="en-GB" sz="1050" b="1" dirty="0" smtClean="0"/>
+              <a:rPr lang="en-GB" sz="1050" b="1" dirty="0"/>
               <a:t>24 null bytes</a:t>
             </a:r>
             <a:endParaRPr lang="fr-FR" sz="1050" b="1" dirty="0"/>
@@ -5813,7 +5807,7 @@
           <a:lstStyle/>
           <a:p>
             <a:r>
-              <a:rPr lang="en-GB" sz="1050" dirty="0" smtClean="0">
+              <a:rPr lang="en-GB" sz="1050" dirty="0">
                 <a:solidFill>
                   <a:srgbClr val="7030A0"/>
                 </a:solidFill>
@@ -5851,15 +5845,15 @@
           <a:lstStyle/>
           <a:p>
             <a:r>
-              <a:rPr lang="en-GB" sz="1100" dirty="0" smtClean="0"/>
+              <a:rPr lang="en-GB" sz="1100" dirty="0"/>
               <a:t>This “explain” the +1 in the file count. It seems this extra “file” is needed to make </a:t>
             </a:r>
             <a:r>
-              <a:rPr lang="en-GB" sz="1100" dirty="0" err="1" smtClean="0"/>
+              <a:rPr lang="en-GB" sz="1100" dirty="0" err="1"/>
               <a:t>prolib</a:t>
             </a:r>
             <a:r>
-              <a:rPr lang="en-GB" sz="1100" dirty="0" smtClean="0"/>
+              <a:rPr lang="en-GB" sz="1100" dirty="0"/>
               <a:t> understand that we should stop listing files. Note that we can put NULL bytes until the next FE and it is absolutely fine. This is because the file path length is 0 so the file is skipped anyway.</a:t>
             </a:r>
             <a:endParaRPr lang="fr-FR" sz="1100" dirty="0"/>
@@ -5911,13 +5905,6 @@
   <p:clrMapOvr>
     <a:masterClrMapping/>
   </p:clrMapOvr>
-  <p:timing>
-    <p:tnLst>
-      <p:par>
-        <p:cTn id="1" dur="indefinite" restart="never" nodeType="tmRoot"/>
-      </p:par>
-    </p:tnLst>
-  </p:timing>
 </p:sld>
 </file>
 
@@ -6181,7 +6168,7 @@
           <a:lstStyle/>
           <a:p>
             <a:r>
-              <a:rPr lang="en-GB" sz="1050" dirty="0" smtClean="0">
+              <a:rPr lang="en-GB" sz="1050" dirty="0">
                 <a:solidFill>
                   <a:srgbClr val="FF0000"/>
                 </a:solidFill>
@@ -6297,7 +6284,7 @@
           <a:lstStyle/>
           <a:p>
             <a:r>
-              <a:rPr lang="en-GB" sz="1050" dirty="0" smtClean="0">
+              <a:rPr lang="en-GB" sz="1050" dirty="0">
                 <a:solidFill>
                   <a:srgbClr val="00B050"/>
                 </a:solidFill>
@@ -6381,7 +6368,7 @@
           <a:lstStyle/>
           <a:p>
             <a:r>
-              <a:rPr lang="en-GB" sz="1050" dirty="0" smtClean="0">
+              <a:rPr lang="en-GB" sz="1050" dirty="0">
                 <a:solidFill>
                   <a:srgbClr val="EEB500"/>
                 </a:solidFill>
@@ -6501,7 +6488,7 @@
           <a:lstStyle/>
           <a:p>
             <a:r>
-              <a:rPr lang="en-GB" sz="1050" dirty="0" smtClean="0">
+              <a:rPr lang="en-GB" sz="1050" dirty="0">
                 <a:solidFill>
                   <a:srgbClr val="00B0F0"/>
                 </a:solidFill>
@@ -6667,7 +6654,7 @@
           <a:lstStyle/>
           <a:p>
             <a:r>
-              <a:rPr lang="en-GB" sz="1050" dirty="0" smtClean="0">
+              <a:rPr lang="en-GB" sz="1050" dirty="0">
                 <a:solidFill>
                   <a:schemeClr val="accent1">
                     <a:lumMod val="75000"/>
@@ -6677,7 +6664,7 @@
               <a:t>Uint</a:t>
             </a:r>
             <a:r>
-              <a:rPr lang="en-GB" sz="1050" b="1" i="1" u="sng" dirty="0" smtClean="0">
+              <a:rPr lang="en-GB" sz="1050" b="1" i="1" u="sng" dirty="0">
                 <a:solidFill>
                   <a:schemeClr val="accent1">
                     <a:lumMod val="75000"/>
@@ -6687,7 +6674,7 @@
               <a:t>32</a:t>
             </a:r>
             <a:r>
-              <a:rPr lang="en-GB" sz="1050" dirty="0" smtClean="0">
+              <a:rPr lang="en-GB" sz="1050" dirty="0">
                 <a:solidFill>
                   <a:schemeClr val="accent1">
                     <a:lumMod val="75000"/>
@@ -6775,7 +6762,7 @@
           <a:lstStyle/>
           <a:p>
             <a:r>
-              <a:rPr lang="en-GB" sz="1050" dirty="0" smtClean="0">
+              <a:rPr lang="en-GB" sz="1050" dirty="0">
                 <a:solidFill>
                   <a:srgbClr val="FF0000"/>
                 </a:solidFill>
@@ -6947,7 +6934,7 @@
           <a:lstStyle/>
           <a:p>
             <a:r>
-              <a:rPr lang="en-GB" sz="1050" dirty="0" smtClean="0">
+              <a:rPr lang="en-GB" sz="1050" dirty="0">
                 <a:solidFill>
                   <a:srgbClr val="7030A0"/>
                 </a:solidFill>
@@ -6957,7 +6944,7 @@
           </a:p>
           <a:p>
             <a:r>
-              <a:rPr lang="en-GB" sz="1050" dirty="0" smtClean="0">
+              <a:rPr lang="en-GB" sz="1050" dirty="0">
                 <a:solidFill>
                   <a:srgbClr val="7030A0"/>
                 </a:solidFill>
@@ -6995,7 +6982,7 @@
           <a:lstStyle/>
           <a:p>
             <a:r>
-              <a:rPr lang="en-GB" sz="1050" dirty="0" smtClean="0">
+              <a:rPr lang="en-GB" sz="1050" dirty="0">
                 <a:solidFill>
                   <a:srgbClr val="FFC000"/>
                 </a:solidFill>
@@ -7156,7 +7143,7 @@
           <a:lstStyle/>
           <a:p>
             <a:r>
-              <a:rPr lang="en-GB" sz="1050" dirty="0" smtClean="0">
+              <a:rPr lang="en-GB" sz="1050" dirty="0">
                 <a:solidFill>
                   <a:srgbClr val="00B0F0"/>
                 </a:solidFill>
@@ -7164,7 +7151,7 @@
               <a:t>The file path (max </a:t>
             </a:r>
             <a:r>
-              <a:rPr lang="en-GB" sz="1050" dirty="0" err="1" smtClean="0">
+              <a:rPr lang="en-GB" sz="1050" dirty="0" err="1">
                 <a:solidFill>
                   <a:srgbClr val="00B0F0"/>
                 </a:solidFill>
@@ -7172,7 +7159,7 @@
               <a:t>lgt</a:t>
             </a:r>
             <a:r>
-              <a:rPr lang="en-GB" sz="1050" dirty="0" smtClean="0">
+              <a:rPr lang="en-GB" sz="1050" dirty="0">
                 <a:solidFill>
                   <a:srgbClr val="00B0F0"/>
                 </a:solidFill>
@@ -7338,7 +7325,7 @@
           <a:lstStyle/>
           <a:p>
             <a:r>
-              <a:rPr lang="en-GB" sz="1050" dirty="0" smtClean="0">
+              <a:rPr lang="en-GB" sz="1050" dirty="0">
                 <a:solidFill>
                   <a:schemeClr val="accent1">
                     <a:lumMod val="75000"/>
@@ -7426,7 +7413,7 @@
           <a:lstStyle/>
           <a:p>
             <a:r>
-              <a:rPr lang="en-GB" sz="1050" dirty="0" smtClean="0">
+              <a:rPr lang="en-GB" sz="1050" dirty="0">
                 <a:solidFill>
                   <a:srgbClr val="FF0000"/>
                 </a:solidFill>
@@ -7434,7 +7421,7 @@
               <a:t>Uint</a:t>
             </a:r>
             <a:r>
-              <a:rPr lang="en-GB" sz="1050" b="1" i="1" u="sng" dirty="0" smtClean="0">
+              <a:rPr lang="en-GB" sz="1050" b="1" i="1" u="sng" dirty="0">
                 <a:solidFill>
                   <a:srgbClr val="FF0000"/>
                 </a:solidFill>
@@ -7442,7 +7429,7 @@
               <a:t>32</a:t>
             </a:r>
             <a:r>
-              <a:rPr lang="en-GB" sz="1050" dirty="0" smtClean="0">
+              <a:rPr lang="en-GB" sz="1050" dirty="0">
                 <a:solidFill>
                   <a:srgbClr val="FF0000"/>
                 </a:solidFill>
@@ -7569,20 +7556,12 @@
           <a:lstStyle/>
           <a:p>
             <a:r>
-              <a:rPr lang="en-GB" sz="1050" dirty="0" smtClean="0">
+              <a:rPr lang="en-GB" sz="1050" dirty="0">
                 <a:solidFill>
                   <a:srgbClr val="00B050"/>
                 </a:solidFill>
               </a:rPr>
-              <a:t>Uint32: File </a:t>
-            </a:r>
-            <a:r>
-              <a:rPr lang="en-GB" sz="1050" dirty="0" smtClean="0">
-                <a:solidFill>
-                  <a:srgbClr val="00B050"/>
-                </a:solidFill>
-              </a:rPr>
-              <a:t>size</a:t>
+              <a:t>Uint32: File size</a:t>
             </a:r>
             <a:endParaRPr lang="fr-FR" sz="1050" dirty="0">
               <a:solidFill>
@@ -7746,7 +7725,7 @@
           <a:lstStyle/>
           <a:p>
             <a:r>
-              <a:rPr lang="en-GB" sz="1050" dirty="0" smtClean="0">
+              <a:rPr lang="en-GB" sz="1050" dirty="0">
                 <a:solidFill>
                   <a:srgbClr val="EEB500"/>
                 </a:solidFill>
@@ -7784,7 +7763,7 @@
           <a:lstStyle/>
           <a:p>
             <a:r>
-              <a:rPr lang="en-GB" sz="1050" dirty="0" smtClean="0">
+              <a:rPr lang="en-GB" sz="1050" dirty="0">
                 <a:solidFill>
                   <a:srgbClr val="00B0F0"/>
                 </a:solidFill>
@@ -8411,7 +8390,7 @@
           <a:lstStyle/>
           <a:p>
             <a:r>
-              <a:rPr lang="en-GB" sz="1050" b="1" dirty="0" smtClean="0"/>
+              <a:rPr lang="en-GB" sz="1050" b="1" dirty="0"/>
               <a:t>8 null bytes</a:t>
             </a:r>
             <a:endParaRPr lang="fr-FR" sz="1050" b="1" dirty="0"/>
@@ -8441,7 +8420,7 @@
           <a:lstStyle/>
           <a:p>
             <a:r>
-              <a:rPr lang="en-GB" sz="1050" b="1" dirty="0" smtClean="0"/>
+              <a:rPr lang="en-GB" sz="1050" b="1" dirty="0"/>
               <a:t>8 null bytes</a:t>
             </a:r>
             <a:endParaRPr lang="fr-FR" sz="1050" b="1" dirty="0"/>
@@ -8599,7 +8578,7 @@
           <a:lstStyle/>
           <a:p>
             <a:r>
-              <a:rPr lang="en-GB" sz="1050" dirty="0" smtClean="0">
+              <a:rPr lang="en-GB" sz="1050" dirty="0">
                 <a:solidFill>
                   <a:srgbClr val="7030A0"/>
                 </a:solidFill>
@@ -8637,15 +8616,15 @@
           <a:lstStyle/>
           <a:p>
             <a:r>
-              <a:rPr lang="en-GB" sz="1100" dirty="0" smtClean="0"/>
+              <a:rPr lang="en-GB" sz="1100" dirty="0"/>
               <a:t>This “explain” the +1 in the file count. It seems this extra “file” is needed to make </a:t>
             </a:r>
             <a:r>
-              <a:rPr lang="en-GB" sz="1100" dirty="0" err="1" smtClean="0"/>
+              <a:rPr lang="en-GB" sz="1100" dirty="0" err="1"/>
               <a:t>prolib</a:t>
             </a:r>
             <a:r>
-              <a:rPr lang="en-GB" sz="1100" dirty="0" smtClean="0"/>
+              <a:rPr lang="en-GB" sz="1100" dirty="0"/>
               <a:t> understand that we should stop listing files</a:t>
             </a:r>
             <a:endParaRPr lang="fr-FR" sz="1100" dirty="0"/>
@@ -8743,13 +8722,1085 @@
   <p:clrMapOvr>
     <a:masterClrMapping/>
   </p:clrMapOvr>
-  <p:timing>
-    <p:tnLst>
-      <p:par>
-        <p:cTn id="1" dur="indefinite" restart="never" nodeType="tmRoot"/>
-      </p:par>
-    </p:tnLst>
-  </p:timing>
+</p:sld>
+</file>
+
+<file path=ppt/slides/slide3.xml><?xml version="1.0" encoding="utf-8"?>
+<p:sld xmlns:a="http://schemas.openxmlformats.org/drawingml/2006/main" xmlns:r="http://schemas.openxmlformats.org/officeDocument/2006/relationships" xmlns:p="http://schemas.openxmlformats.org/presentationml/2006/main">
+  <p:cSld>
+    <p:spTree>
+      <p:nvGrpSpPr>
+        <p:cNvPr id="1" name=""/>
+        <p:cNvGrpSpPr/>
+        <p:nvPr/>
+      </p:nvGrpSpPr>
+      <p:grpSpPr>
+        <a:xfrm>
+          <a:off x="0" y="0"/>
+          <a:ext cx="0" cy="0"/>
+          <a:chOff x="0" y="0"/>
+          <a:chExt cx="0" cy="0"/>
+        </a:xfrm>
+      </p:grpSpPr>
+      <p:pic>
+        <p:nvPicPr>
+          <p:cNvPr id="10" name="Picture 9"/>
+          <p:cNvPicPr>
+            <a:picLocks noChangeAspect="1"/>
+          </p:cNvPicPr>
+          <p:nvPr/>
+        </p:nvPicPr>
+        <p:blipFill>
+          <a:blip r:embed="rId2"/>
+          <a:stretch>
+            <a:fillRect/>
+          </a:stretch>
+        </p:blipFill>
+        <p:spPr>
+          <a:xfrm>
+            <a:off x="4014787" y="2000250"/>
+            <a:ext cx="4162425" cy="2857500"/>
+          </a:xfrm>
+          <a:prstGeom prst="rect">
+            <a:avLst/>
+          </a:prstGeom>
+        </p:spPr>
+      </p:pic>
+      <p:sp>
+        <p:nvSpPr>
+          <p:cNvPr id="6" name="Rectangle 5"/>
+          <p:cNvSpPr/>
+          <p:nvPr/>
+        </p:nvSpPr>
+        <p:spPr>
+          <a:xfrm>
+            <a:off x="6654114" y="2622735"/>
+            <a:ext cx="469783" cy="145935"/>
+          </a:xfrm>
+          <a:prstGeom prst="rect">
+            <a:avLst/>
+          </a:prstGeom>
+          <a:noFill/>
+          <a:ln>
+            <a:solidFill>
+              <a:srgbClr val="FF0000"/>
+            </a:solidFill>
+          </a:ln>
+        </p:spPr>
+        <p:style>
+          <a:lnRef idx="2">
+            <a:schemeClr val="accent1">
+              <a:shade val="50000"/>
+            </a:schemeClr>
+          </a:lnRef>
+          <a:fillRef idx="1">
+            <a:schemeClr val="accent1"/>
+          </a:fillRef>
+          <a:effectRef idx="0">
+            <a:schemeClr val="accent1"/>
+          </a:effectRef>
+          <a:fontRef idx="minor">
+            <a:schemeClr val="lt1"/>
+          </a:fontRef>
+        </p:style>
+        <p:txBody>
+          <a:bodyPr rtlCol="0" anchor="ctr"/>
+          <a:lstStyle/>
+          <a:p>
+            <a:pPr algn="ctr"/>
+            <a:endParaRPr lang="fr-FR" dirty="0"/>
+          </a:p>
+        </p:txBody>
+      </p:sp>
+      <p:sp>
+        <p:nvSpPr>
+          <p:cNvPr id="12" name="TextBox 11"/>
+          <p:cNvSpPr txBox="1"/>
+          <p:nvPr/>
+        </p:nvSpPr>
+        <p:spPr>
+          <a:xfrm>
+            <a:off x="8321367" y="2410739"/>
+            <a:ext cx="1390285" cy="415498"/>
+          </a:xfrm>
+          <a:prstGeom prst="rect">
+            <a:avLst/>
+          </a:prstGeom>
+          <a:noFill/>
+        </p:spPr>
+        <p:txBody>
+          <a:bodyPr wrap="square" rtlCol="0">
+            <a:spAutoFit/>
+          </a:bodyPr>
+          <a:lstStyle/>
+          <a:p>
+            <a:r>
+              <a:rPr lang="en-GB" sz="1050" dirty="0">
+                <a:solidFill>
+                  <a:srgbClr val="FF0000"/>
+                </a:solidFill>
+              </a:rPr>
+              <a:t>Compute header CRC from this byte array</a:t>
+            </a:r>
+            <a:endParaRPr lang="fr-FR" sz="1050" dirty="0">
+              <a:solidFill>
+                <a:srgbClr val="FF0000"/>
+              </a:solidFill>
+            </a:endParaRPr>
+          </a:p>
+        </p:txBody>
+      </p:sp>
+      <p:cxnSp>
+        <p:nvCxnSpPr>
+          <p:cNvPr id="14" name="Straight Arrow Connector 13"/>
+          <p:cNvCxnSpPr>
+            <a:cxnSpLocks/>
+            <a:stCxn id="12" idx="1"/>
+            <a:endCxn id="81" idx="3"/>
+          </p:cNvCxnSpPr>
+          <p:nvPr/>
+        </p:nvCxnSpPr>
+        <p:spPr>
+          <a:xfrm flipH="1">
+            <a:off x="7123897" y="2618488"/>
+            <a:ext cx="1197470" cy="247864"/>
+          </a:xfrm>
+          <a:prstGeom prst="straightConnector1">
+            <a:avLst/>
+          </a:prstGeom>
+          <a:ln>
+            <a:solidFill>
+              <a:srgbClr val="FF0000"/>
+            </a:solidFill>
+            <a:tailEnd type="triangle"/>
+          </a:ln>
+        </p:spPr>
+        <p:style>
+          <a:lnRef idx="1">
+            <a:schemeClr val="accent1"/>
+          </a:lnRef>
+          <a:fillRef idx="0">
+            <a:schemeClr val="accent1"/>
+          </a:fillRef>
+          <a:effectRef idx="0">
+            <a:schemeClr val="accent1"/>
+          </a:effectRef>
+          <a:fontRef idx="minor">
+            <a:schemeClr val="tx1"/>
+          </a:fontRef>
+        </p:style>
+      </p:cxnSp>
+      <p:sp>
+        <p:nvSpPr>
+          <p:cNvPr id="72" name="Rectangle 71">
+            <a:extLst>
+              <a:ext uri="{FF2B5EF4-FFF2-40B4-BE49-F238E27FC236}">
+                <a16:creationId xmlns:a16="http://schemas.microsoft.com/office/drawing/2014/main" id="{4B501375-D459-48EB-B63E-36159E7AE2A6}"/>
+              </a:ext>
+            </a:extLst>
+          </p:cNvPr>
+          <p:cNvSpPr/>
+          <p:nvPr/>
+        </p:nvSpPr>
+        <p:spPr>
+          <a:xfrm>
+            <a:off x="6221005" y="2639212"/>
+            <a:ext cx="408395" cy="145934"/>
+          </a:xfrm>
+          <a:prstGeom prst="rect">
+            <a:avLst/>
+          </a:prstGeom>
+          <a:noFill/>
+          <a:ln>
+            <a:solidFill>
+              <a:srgbClr val="FFC000"/>
+            </a:solidFill>
+          </a:ln>
+        </p:spPr>
+        <p:style>
+          <a:lnRef idx="2">
+            <a:schemeClr val="accent1">
+              <a:shade val="50000"/>
+            </a:schemeClr>
+          </a:lnRef>
+          <a:fillRef idx="1">
+            <a:schemeClr val="accent1"/>
+          </a:fillRef>
+          <a:effectRef idx="0">
+            <a:schemeClr val="accent1"/>
+          </a:effectRef>
+          <a:fontRef idx="minor">
+            <a:schemeClr val="lt1"/>
+          </a:fontRef>
+        </p:style>
+        <p:txBody>
+          <a:bodyPr rtlCol="0" anchor="ctr"/>
+          <a:lstStyle/>
+          <a:p>
+            <a:pPr algn="ctr"/>
+            <a:endParaRPr lang="fr-FR"/>
+          </a:p>
+        </p:txBody>
+      </p:sp>
+      <p:sp>
+        <p:nvSpPr>
+          <p:cNvPr id="73" name="TextBox 19">
+            <a:extLst>
+              <a:ext uri="{FF2B5EF4-FFF2-40B4-BE49-F238E27FC236}">
+                <a16:creationId xmlns:a16="http://schemas.microsoft.com/office/drawing/2014/main" id="{6BF58CD4-2E05-4F7D-ADC9-35899B24BF87}"/>
+              </a:ext>
+            </a:extLst>
+          </p:cNvPr>
+          <p:cNvSpPr txBox="1"/>
+          <p:nvPr/>
+        </p:nvSpPr>
+        <p:spPr>
+          <a:xfrm>
+            <a:off x="7301236" y="1305401"/>
+            <a:ext cx="1873504" cy="253916"/>
+          </a:xfrm>
+          <a:prstGeom prst="rect">
+            <a:avLst/>
+          </a:prstGeom>
+          <a:noFill/>
+        </p:spPr>
+        <p:txBody>
+          <a:bodyPr wrap="square" rtlCol="0">
+            <a:spAutoFit/>
+          </a:bodyPr>
+          <a:lstStyle/>
+          <a:p>
+            <a:r>
+              <a:rPr lang="en-GB" sz="1050" dirty="0">
+                <a:solidFill>
+                  <a:srgbClr val="EEB500"/>
+                </a:solidFill>
+              </a:rPr>
+              <a:t>Uint16:pl header CRC (17443) </a:t>
+            </a:r>
+            <a:endParaRPr lang="fr-FR" sz="1050" dirty="0">
+              <a:solidFill>
+                <a:srgbClr val="EEB500"/>
+              </a:solidFill>
+            </a:endParaRPr>
+          </a:p>
+        </p:txBody>
+      </p:sp>
+      <p:cxnSp>
+        <p:nvCxnSpPr>
+          <p:cNvPr id="74" name="Straight Arrow Connector 21">
+            <a:extLst>
+              <a:ext uri="{FF2B5EF4-FFF2-40B4-BE49-F238E27FC236}">
+                <a16:creationId xmlns:a16="http://schemas.microsoft.com/office/drawing/2014/main" id="{331B8E14-B77C-40E8-82DD-E99E2F23D4A7}"/>
+              </a:ext>
+            </a:extLst>
+          </p:cNvPr>
+          <p:cNvCxnSpPr>
+            <a:stCxn id="73" idx="1"/>
+            <a:endCxn id="72" idx="0"/>
+          </p:cNvCxnSpPr>
+          <p:nvPr/>
+        </p:nvCxnSpPr>
+        <p:spPr>
+          <a:xfrm flipH="1">
+            <a:off x="6425203" y="1432359"/>
+            <a:ext cx="876033" cy="1206853"/>
+          </a:xfrm>
+          <a:prstGeom prst="straightConnector1">
+            <a:avLst/>
+          </a:prstGeom>
+          <a:ln w="12700">
+            <a:tailEnd type="triangle"/>
+          </a:ln>
+        </p:spPr>
+        <p:style>
+          <a:lnRef idx="1">
+            <a:schemeClr val="accent4"/>
+          </a:lnRef>
+          <a:fillRef idx="0">
+            <a:schemeClr val="accent4"/>
+          </a:fillRef>
+          <a:effectRef idx="0">
+            <a:schemeClr val="accent4"/>
+          </a:effectRef>
+          <a:fontRef idx="minor">
+            <a:schemeClr val="tx1"/>
+          </a:fontRef>
+        </p:style>
+      </p:cxnSp>
+      <p:sp>
+        <p:nvSpPr>
+          <p:cNvPr id="81" name="Rectangle 80">
+            <a:extLst>
+              <a:ext uri="{FF2B5EF4-FFF2-40B4-BE49-F238E27FC236}">
+                <a16:creationId xmlns:a16="http://schemas.microsoft.com/office/drawing/2014/main" id="{B0345EED-16BC-4CA8-8135-F0AD0772E596}"/>
+              </a:ext>
+            </a:extLst>
+          </p:cNvPr>
+          <p:cNvSpPr/>
+          <p:nvPr/>
+        </p:nvSpPr>
+        <p:spPr>
+          <a:xfrm>
+            <a:off x="4837671" y="2793384"/>
+            <a:ext cx="2286226" cy="145935"/>
+          </a:xfrm>
+          <a:prstGeom prst="rect">
+            <a:avLst/>
+          </a:prstGeom>
+          <a:noFill/>
+          <a:ln>
+            <a:solidFill>
+              <a:srgbClr val="FF0000"/>
+            </a:solidFill>
+          </a:ln>
+        </p:spPr>
+        <p:style>
+          <a:lnRef idx="2">
+            <a:schemeClr val="accent1">
+              <a:shade val="50000"/>
+            </a:schemeClr>
+          </a:lnRef>
+          <a:fillRef idx="1">
+            <a:schemeClr val="accent1"/>
+          </a:fillRef>
+          <a:effectRef idx="0">
+            <a:schemeClr val="accent1"/>
+          </a:effectRef>
+          <a:fontRef idx="minor">
+            <a:schemeClr val="lt1"/>
+          </a:fontRef>
+        </p:style>
+        <p:txBody>
+          <a:bodyPr rtlCol="0" anchor="ctr"/>
+          <a:lstStyle/>
+          <a:p>
+            <a:pPr algn="ctr"/>
+            <a:endParaRPr lang="fr-FR" dirty="0"/>
+          </a:p>
+        </p:txBody>
+      </p:sp>
+      <p:sp>
+        <p:nvSpPr>
+          <p:cNvPr id="82" name="Rectangle 81">
+            <a:extLst>
+              <a:ext uri="{FF2B5EF4-FFF2-40B4-BE49-F238E27FC236}">
+                <a16:creationId xmlns:a16="http://schemas.microsoft.com/office/drawing/2014/main" id="{516AE620-D74B-4AA4-8300-AFAA1E1BF634}"/>
+              </a:ext>
+            </a:extLst>
+          </p:cNvPr>
+          <p:cNvSpPr/>
+          <p:nvPr/>
+        </p:nvSpPr>
+        <p:spPr>
+          <a:xfrm>
+            <a:off x="4837671" y="2966094"/>
+            <a:ext cx="467497" cy="145935"/>
+          </a:xfrm>
+          <a:prstGeom prst="rect">
+            <a:avLst/>
+          </a:prstGeom>
+          <a:noFill/>
+          <a:ln>
+            <a:solidFill>
+              <a:srgbClr val="FF0000"/>
+            </a:solidFill>
+          </a:ln>
+        </p:spPr>
+        <p:style>
+          <a:lnRef idx="2">
+            <a:schemeClr val="accent1">
+              <a:shade val="50000"/>
+            </a:schemeClr>
+          </a:lnRef>
+          <a:fillRef idx="1">
+            <a:schemeClr val="accent1"/>
+          </a:fillRef>
+          <a:effectRef idx="0">
+            <a:schemeClr val="accent1"/>
+          </a:effectRef>
+          <a:fontRef idx="minor">
+            <a:schemeClr val="lt1"/>
+          </a:fontRef>
+        </p:style>
+        <p:txBody>
+          <a:bodyPr rtlCol="0" anchor="ctr"/>
+          <a:lstStyle/>
+          <a:p>
+            <a:pPr algn="ctr"/>
+            <a:endParaRPr lang="fr-FR" dirty="0"/>
+          </a:p>
+        </p:txBody>
+      </p:sp>
+    </p:spTree>
+    <p:extLst>
+      <p:ext uri="{BB962C8B-B14F-4D97-AF65-F5344CB8AC3E}">
+        <p14:creationId xmlns:p14="http://schemas.microsoft.com/office/powerpoint/2010/main" val="4056917214"/>
+      </p:ext>
+    </p:extLst>
+  </p:cSld>
+  <p:clrMapOvr>
+    <a:masterClrMapping/>
+  </p:clrMapOvr>
+</p:sld>
+</file>
+
+<file path=ppt/slides/slide4.xml><?xml version="1.0" encoding="utf-8"?>
+<p:sld xmlns:a="http://schemas.openxmlformats.org/drawingml/2006/main" xmlns:r="http://schemas.openxmlformats.org/officeDocument/2006/relationships" xmlns:p="http://schemas.openxmlformats.org/presentationml/2006/main">
+  <p:cSld>
+    <p:spTree>
+      <p:nvGrpSpPr>
+        <p:cNvPr id="1" name=""/>
+        <p:cNvGrpSpPr/>
+        <p:nvPr/>
+      </p:nvGrpSpPr>
+      <p:grpSpPr>
+        <a:xfrm>
+          <a:off x="0" y="0"/>
+          <a:ext cx="0" cy="0"/>
+          <a:chOff x="0" y="0"/>
+          <a:chExt cx="0" cy="0"/>
+        </a:xfrm>
+      </p:grpSpPr>
+      <p:pic>
+        <p:nvPicPr>
+          <p:cNvPr id="10" name="Picture 9"/>
+          <p:cNvPicPr>
+            <a:picLocks noChangeAspect="1"/>
+          </p:cNvPicPr>
+          <p:nvPr/>
+        </p:nvPicPr>
+        <p:blipFill>
+          <a:blip r:embed="rId2"/>
+          <a:stretch>
+            <a:fillRect/>
+          </a:stretch>
+        </p:blipFill>
+        <p:spPr>
+          <a:xfrm>
+            <a:off x="4014787" y="2000250"/>
+            <a:ext cx="4162425" cy="2857500"/>
+          </a:xfrm>
+          <a:prstGeom prst="rect">
+            <a:avLst/>
+          </a:prstGeom>
+        </p:spPr>
+      </p:pic>
+      <p:sp>
+        <p:nvSpPr>
+          <p:cNvPr id="11" name="Rectangle 10">
+            <a:extLst>
+              <a:ext uri="{FF2B5EF4-FFF2-40B4-BE49-F238E27FC236}">
+                <a16:creationId xmlns:a16="http://schemas.microsoft.com/office/drawing/2014/main" id="{1A7F0C95-2255-4D1D-B5BF-F92CCF2047D3}"/>
+              </a:ext>
+            </a:extLst>
+          </p:cNvPr>
+          <p:cNvSpPr/>
+          <p:nvPr/>
+        </p:nvSpPr>
+        <p:spPr>
+          <a:xfrm>
+            <a:off x="6907574" y="2972787"/>
+            <a:ext cx="181341" cy="140074"/>
+          </a:xfrm>
+          <a:prstGeom prst="rect">
+            <a:avLst/>
+          </a:prstGeom>
+          <a:noFill/>
+          <a:ln>
+            <a:solidFill>
+              <a:schemeClr val="accent1">
+                <a:lumMod val="75000"/>
+              </a:schemeClr>
+            </a:solidFill>
+          </a:ln>
+        </p:spPr>
+        <p:style>
+          <a:lnRef idx="2">
+            <a:schemeClr val="accent1">
+              <a:shade val="50000"/>
+            </a:schemeClr>
+          </a:lnRef>
+          <a:fillRef idx="1">
+            <a:schemeClr val="accent1"/>
+          </a:fillRef>
+          <a:effectRef idx="0">
+            <a:schemeClr val="accent1"/>
+          </a:effectRef>
+          <a:fontRef idx="minor">
+            <a:schemeClr val="lt1"/>
+          </a:fontRef>
+        </p:style>
+        <p:txBody>
+          <a:bodyPr rtlCol="0" anchor="ctr"/>
+          <a:lstStyle/>
+          <a:p>
+            <a:pPr algn="ctr"/>
+            <a:endParaRPr lang="fr-FR"/>
+          </a:p>
+        </p:txBody>
+      </p:sp>
+      <p:sp>
+        <p:nvSpPr>
+          <p:cNvPr id="13" name="Rectangle 12">
+            <a:extLst>
+              <a:ext uri="{FF2B5EF4-FFF2-40B4-BE49-F238E27FC236}">
+                <a16:creationId xmlns:a16="http://schemas.microsoft.com/office/drawing/2014/main" id="{3F8C870B-3A59-4BDE-A04C-C72409CAAC03}"/>
+              </a:ext>
+            </a:extLst>
+          </p:cNvPr>
+          <p:cNvSpPr/>
+          <p:nvPr/>
+        </p:nvSpPr>
+        <p:spPr>
+          <a:xfrm>
+            <a:off x="4854737" y="3144540"/>
+            <a:ext cx="181341" cy="140074"/>
+          </a:xfrm>
+          <a:prstGeom prst="rect">
+            <a:avLst/>
+          </a:prstGeom>
+          <a:noFill/>
+          <a:ln>
+            <a:solidFill>
+              <a:schemeClr val="accent1">
+                <a:lumMod val="75000"/>
+              </a:schemeClr>
+            </a:solidFill>
+          </a:ln>
+        </p:spPr>
+        <p:style>
+          <a:lnRef idx="2">
+            <a:schemeClr val="accent1">
+              <a:shade val="50000"/>
+            </a:schemeClr>
+          </a:lnRef>
+          <a:fillRef idx="1">
+            <a:schemeClr val="accent1"/>
+          </a:fillRef>
+          <a:effectRef idx="0">
+            <a:schemeClr val="accent1"/>
+          </a:effectRef>
+          <a:fontRef idx="minor">
+            <a:schemeClr val="lt1"/>
+          </a:fontRef>
+        </p:style>
+        <p:txBody>
+          <a:bodyPr rtlCol="0" anchor="ctr"/>
+          <a:lstStyle/>
+          <a:p>
+            <a:pPr algn="ctr"/>
+            <a:endParaRPr lang="fr-FR"/>
+          </a:p>
+        </p:txBody>
+      </p:sp>
+      <p:cxnSp>
+        <p:nvCxnSpPr>
+          <p:cNvPr id="15" name="Straight Arrow Connector 79">
+            <a:extLst>
+              <a:ext uri="{FF2B5EF4-FFF2-40B4-BE49-F238E27FC236}">
+                <a16:creationId xmlns:a16="http://schemas.microsoft.com/office/drawing/2014/main" id="{8DBB5130-F726-4CE4-9E3B-57729F784CA6}"/>
+              </a:ext>
+            </a:extLst>
+          </p:cNvPr>
+          <p:cNvCxnSpPr>
+            <a:stCxn id="16" idx="1"/>
+            <a:endCxn id="11" idx="3"/>
+          </p:cNvCxnSpPr>
+          <p:nvPr/>
+        </p:nvCxnSpPr>
+        <p:spPr>
+          <a:xfrm flipH="1">
+            <a:off x="7088915" y="2488344"/>
+            <a:ext cx="1158184" cy="554480"/>
+          </a:xfrm>
+          <a:prstGeom prst="straightConnector1">
+            <a:avLst/>
+          </a:prstGeom>
+          <a:ln w="12700">
+            <a:solidFill>
+              <a:schemeClr val="accent1">
+                <a:lumMod val="75000"/>
+              </a:schemeClr>
+            </a:solidFill>
+            <a:tailEnd type="triangle"/>
+          </a:ln>
+        </p:spPr>
+        <p:style>
+          <a:lnRef idx="1">
+            <a:schemeClr val="accent4"/>
+          </a:lnRef>
+          <a:fillRef idx="0">
+            <a:schemeClr val="accent4"/>
+          </a:fillRef>
+          <a:effectRef idx="0">
+            <a:schemeClr val="accent4"/>
+          </a:effectRef>
+          <a:fontRef idx="minor">
+            <a:schemeClr val="tx1"/>
+          </a:fontRef>
+        </p:style>
+      </p:cxnSp>
+      <p:sp>
+        <p:nvSpPr>
+          <p:cNvPr id="16" name="TextBox 82">
+            <a:extLst>
+              <a:ext uri="{FF2B5EF4-FFF2-40B4-BE49-F238E27FC236}">
+                <a16:creationId xmlns:a16="http://schemas.microsoft.com/office/drawing/2014/main" id="{6571E898-361D-4F7C-9926-1982C336ED8C}"/>
+              </a:ext>
+            </a:extLst>
+          </p:cNvPr>
+          <p:cNvSpPr txBox="1"/>
+          <p:nvPr/>
+        </p:nvSpPr>
+        <p:spPr>
+          <a:xfrm>
+            <a:off x="8247099" y="2361386"/>
+            <a:ext cx="1226693" cy="253916"/>
+          </a:xfrm>
+          <a:prstGeom prst="rect">
+            <a:avLst/>
+          </a:prstGeom>
+          <a:noFill/>
+        </p:spPr>
+        <p:txBody>
+          <a:bodyPr wrap="square" rtlCol="0">
+            <a:spAutoFit/>
+          </a:bodyPr>
+          <a:lstStyle/>
+          <a:p>
+            <a:r>
+              <a:rPr lang="en-GB" sz="1050" dirty="0">
+                <a:solidFill>
+                  <a:schemeClr val="accent1">
+                    <a:lumMod val="75000"/>
+                  </a:schemeClr>
+                </a:solidFill>
+              </a:rPr>
+              <a:t>Uint16:file CRC</a:t>
+            </a:r>
+            <a:endParaRPr lang="fr-FR" sz="1050" dirty="0">
+              <a:solidFill>
+                <a:schemeClr val="accent1">
+                  <a:lumMod val="75000"/>
+                </a:schemeClr>
+              </a:solidFill>
+            </a:endParaRPr>
+          </a:p>
+        </p:txBody>
+      </p:sp>
+      <p:sp>
+        <p:nvSpPr>
+          <p:cNvPr id="17" name="Rectangle 16">
+            <a:extLst>
+              <a:ext uri="{FF2B5EF4-FFF2-40B4-BE49-F238E27FC236}">
+                <a16:creationId xmlns:a16="http://schemas.microsoft.com/office/drawing/2014/main" id="{B9E06AD5-6190-401B-A40B-8CE71C050F7F}"/>
+              </a:ext>
+            </a:extLst>
+          </p:cNvPr>
+          <p:cNvSpPr/>
+          <p:nvPr/>
+        </p:nvSpPr>
+        <p:spPr>
+          <a:xfrm>
+            <a:off x="5988908" y="2976963"/>
+            <a:ext cx="889969" cy="140074"/>
+          </a:xfrm>
+          <a:prstGeom prst="rect">
+            <a:avLst/>
+          </a:prstGeom>
+          <a:noFill/>
+          <a:ln>
+            <a:solidFill>
+              <a:srgbClr val="FF0000"/>
+            </a:solidFill>
+          </a:ln>
+        </p:spPr>
+        <p:style>
+          <a:lnRef idx="2">
+            <a:schemeClr val="accent1">
+              <a:shade val="50000"/>
+            </a:schemeClr>
+          </a:lnRef>
+          <a:fillRef idx="1">
+            <a:schemeClr val="accent1"/>
+          </a:fillRef>
+          <a:effectRef idx="0">
+            <a:schemeClr val="accent1"/>
+          </a:effectRef>
+          <a:fontRef idx="minor">
+            <a:schemeClr val="lt1"/>
+          </a:fontRef>
+        </p:style>
+        <p:txBody>
+          <a:bodyPr rtlCol="0" anchor="ctr"/>
+          <a:lstStyle/>
+          <a:p>
+            <a:pPr algn="ctr"/>
+            <a:endParaRPr lang="fr-FR" dirty="0"/>
+          </a:p>
+        </p:txBody>
+      </p:sp>
+      <p:sp>
+        <p:nvSpPr>
+          <p:cNvPr id="18" name="Rectangle 17">
+            <a:extLst>
+              <a:ext uri="{FF2B5EF4-FFF2-40B4-BE49-F238E27FC236}">
+                <a16:creationId xmlns:a16="http://schemas.microsoft.com/office/drawing/2014/main" id="{29DDD8C1-ED62-405B-B925-294B21D8002A}"/>
+              </a:ext>
+            </a:extLst>
+          </p:cNvPr>
+          <p:cNvSpPr/>
+          <p:nvPr/>
+        </p:nvSpPr>
+        <p:spPr>
+          <a:xfrm>
+            <a:off x="5074225" y="3136302"/>
+            <a:ext cx="2014690" cy="148312"/>
+          </a:xfrm>
+          <a:prstGeom prst="rect">
+            <a:avLst/>
+          </a:prstGeom>
+          <a:noFill/>
+          <a:ln>
+            <a:solidFill>
+              <a:srgbClr val="FF0000"/>
+            </a:solidFill>
+          </a:ln>
+        </p:spPr>
+        <p:style>
+          <a:lnRef idx="2">
+            <a:schemeClr val="accent1">
+              <a:shade val="50000"/>
+            </a:schemeClr>
+          </a:lnRef>
+          <a:fillRef idx="1">
+            <a:schemeClr val="accent1"/>
+          </a:fillRef>
+          <a:effectRef idx="0">
+            <a:schemeClr val="accent1"/>
+          </a:effectRef>
+          <a:fontRef idx="minor">
+            <a:schemeClr val="lt1"/>
+          </a:fontRef>
+        </p:style>
+        <p:txBody>
+          <a:bodyPr rtlCol="0" anchor="ctr"/>
+          <a:lstStyle/>
+          <a:p>
+            <a:pPr algn="ctr"/>
+            <a:endParaRPr lang="fr-FR" dirty="0"/>
+          </a:p>
+        </p:txBody>
+      </p:sp>
+      <p:sp>
+        <p:nvSpPr>
+          <p:cNvPr id="19" name="Rectangle 18">
+            <a:extLst>
+              <a:ext uri="{FF2B5EF4-FFF2-40B4-BE49-F238E27FC236}">
+                <a16:creationId xmlns:a16="http://schemas.microsoft.com/office/drawing/2014/main" id="{303148C5-6E74-4F6D-B8BC-A1389CD70220}"/>
+              </a:ext>
+            </a:extLst>
+          </p:cNvPr>
+          <p:cNvSpPr/>
+          <p:nvPr/>
+        </p:nvSpPr>
+        <p:spPr>
+          <a:xfrm>
+            <a:off x="4856198" y="3829581"/>
+            <a:ext cx="1363370" cy="140074"/>
+          </a:xfrm>
+          <a:prstGeom prst="rect">
+            <a:avLst/>
+          </a:prstGeom>
+          <a:noFill/>
+          <a:ln>
+            <a:solidFill>
+              <a:srgbClr val="FF0000"/>
+            </a:solidFill>
+          </a:ln>
+        </p:spPr>
+        <p:style>
+          <a:lnRef idx="2">
+            <a:schemeClr val="accent1">
+              <a:shade val="50000"/>
+            </a:schemeClr>
+          </a:lnRef>
+          <a:fillRef idx="1">
+            <a:schemeClr val="accent1"/>
+          </a:fillRef>
+          <a:effectRef idx="0">
+            <a:schemeClr val="accent1"/>
+          </a:effectRef>
+          <a:fontRef idx="minor">
+            <a:schemeClr val="lt1"/>
+          </a:fontRef>
+        </p:style>
+        <p:txBody>
+          <a:bodyPr rtlCol="0" anchor="ctr"/>
+          <a:lstStyle/>
+          <a:p>
+            <a:pPr algn="ctr"/>
+            <a:endParaRPr lang="fr-FR" dirty="0"/>
+          </a:p>
+        </p:txBody>
+      </p:sp>
+      <p:sp>
+        <p:nvSpPr>
+          <p:cNvPr id="20" name="Rectangle 19">
+            <a:extLst>
+              <a:ext uri="{FF2B5EF4-FFF2-40B4-BE49-F238E27FC236}">
+                <a16:creationId xmlns:a16="http://schemas.microsoft.com/office/drawing/2014/main" id="{D04014B4-672F-4616-ADBF-A04D5CD486DC}"/>
+              </a:ext>
+            </a:extLst>
+          </p:cNvPr>
+          <p:cNvSpPr/>
+          <p:nvPr/>
+        </p:nvSpPr>
+        <p:spPr>
+          <a:xfrm>
+            <a:off x="4837671" y="3312368"/>
+            <a:ext cx="2286226" cy="145935"/>
+          </a:xfrm>
+          <a:prstGeom prst="rect">
+            <a:avLst/>
+          </a:prstGeom>
+          <a:noFill/>
+          <a:ln>
+            <a:solidFill>
+              <a:srgbClr val="FF0000"/>
+            </a:solidFill>
+          </a:ln>
+        </p:spPr>
+        <p:style>
+          <a:lnRef idx="2">
+            <a:schemeClr val="accent1">
+              <a:shade val="50000"/>
+            </a:schemeClr>
+          </a:lnRef>
+          <a:fillRef idx="1">
+            <a:schemeClr val="accent1"/>
+          </a:fillRef>
+          <a:effectRef idx="0">
+            <a:schemeClr val="accent1"/>
+          </a:effectRef>
+          <a:fontRef idx="minor">
+            <a:schemeClr val="lt1"/>
+          </a:fontRef>
+        </p:style>
+        <p:txBody>
+          <a:bodyPr rtlCol="0" anchor="ctr"/>
+          <a:lstStyle/>
+          <a:p>
+            <a:pPr algn="ctr"/>
+            <a:endParaRPr lang="fr-FR" dirty="0"/>
+          </a:p>
+        </p:txBody>
+      </p:sp>
+      <p:sp>
+        <p:nvSpPr>
+          <p:cNvPr id="21" name="Rectangle 20">
+            <a:extLst>
+              <a:ext uri="{FF2B5EF4-FFF2-40B4-BE49-F238E27FC236}">
+                <a16:creationId xmlns:a16="http://schemas.microsoft.com/office/drawing/2014/main" id="{F165F946-62D6-4519-8BDD-12489CB2D531}"/>
+              </a:ext>
+            </a:extLst>
+          </p:cNvPr>
+          <p:cNvSpPr/>
+          <p:nvPr/>
+        </p:nvSpPr>
+        <p:spPr>
+          <a:xfrm>
+            <a:off x="4837671" y="3485364"/>
+            <a:ext cx="2286226" cy="145935"/>
+          </a:xfrm>
+          <a:prstGeom prst="rect">
+            <a:avLst/>
+          </a:prstGeom>
+          <a:noFill/>
+          <a:ln>
+            <a:solidFill>
+              <a:srgbClr val="FF0000"/>
+            </a:solidFill>
+          </a:ln>
+        </p:spPr>
+        <p:style>
+          <a:lnRef idx="2">
+            <a:schemeClr val="accent1">
+              <a:shade val="50000"/>
+            </a:schemeClr>
+          </a:lnRef>
+          <a:fillRef idx="1">
+            <a:schemeClr val="accent1"/>
+          </a:fillRef>
+          <a:effectRef idx="0">
+            <a:schemeClr val="accent1"/>
+          </a:effectRef>
+          <a:fontRef idx="minor">
+            <a:schemeClr val="lt1"/>
+          </a:fontRef>
+        </p:style>
+        <p:txBody>
+          <a:bodyPr rtlCol="0" anchor="ctr"/>
+          <a:lstStyle/>
+          <a:p>
+            <a:pPr algn="ctr"/>
+            <a:endParaRPr lang="fr-FR" dirty="0"/>
+          </a:p>
+        </p:txBody>
+      </p:sp>
+      <p:sp>
+        <p:nvSpPr>
+          <p:cNvPr id="22" name="Rectangle 21">
+            <a:extLst>
+              <a:ext uri="{FF2B5EF4-FFF2-40B4-BE49-F238E27FC236}">
+                <a16:creationId xmlns:a16="http://schemas.microsoft.com/office/drawing/2014/main" id="{909F46A7-801B-4E54-BE32-EC945623FDC4}"/>
+              </a:ext>
+            </a:extLst>
+          </p:cNvPr>
+          <p:cNvSpPr/>
+          <p:nvPr/>
+        </p:nvSpPr>
+        <p:spPr>
+          <a:xfrm>
+            <a:off x="4837671" y="3658362"/>
+            <a:ext cx="2286226" cy="145935"/>
+          </a:xfrm>
+          <a:prstGeom prst="rect">
+            <a:avLst/>
+          </a:prstGeom>
+          <a:noFill/>
+          <a:ln>
+            <a:solidFill>
+              <a:srgbClr val="FF0000"/>
+            </a:solidFill>
+          </a:ln>
+        </p:spPr>
+        <p:style>
+          <a:lnRef idx="2">
+            <a:schemeClr val="accent1">
+              <a:shade val="50000"/>
+            </a:schemeClr>
+          </a:lnRef>
+          <a:fillRef idx="1">
+            <a:schemeClr val="accent1"/>
+          </a:fillRef>
+          <a:effectRef idx="0">
+            <a:schemeClr val="accent1"/>
+          </a:effectRef>
+          <a:fontRef idx="minor">
+            <a:schemeClr val="lt1"/>
+          </a:fontRef>
+        </p:style>
+        <p:txBody>
+          <a:bodyPr rtlCol="0" anchor="ctr"/>
+          <a:lstStyle/>
+          <a:p>
+            <a:pPr algn="ctr"/>
+            <a:endParaRPr lang="fr-FR" dirty="0"/>
+          </a:p>
+        </p:txBody>
+      </p:sp>
+      <p:sp>
+        <p:nvSpPr>
+          <p:cNvPr id="23" name="TextBox 11">
+            <a:extLst>
+              <a:ext uri="{FF2B5EF4-FFF2-40B4-BE49-F238E27FC236}">
+                <a16:creationId xmlns:a16="http://schemas.microsoft.com/office/drawing/2014/main" id="{F946F7CA-DC2B-4922-B004-84C3E9C605E7}"/>
+              </a:ext>
+            </a:extLst>
+          </p:cNvPr>
+          <p:cNvSpPr txBox="1"/>
+          <p:nvPr/>
+        </p:nvSpPr>
+        <p:spPr>
+          <a:xfrm>
+            <a:off x="8321367" y="3053292"/>
+            <a:ext cx="1390285" cy="415498"/>
+          </a:xfrm>
+          <a:prstGeom prst="rect">
+            <a:avLst/>
+          </a:prstGeom>
+          <a:noFill/>
+        </p:spPr>
+        <p:txBody>
+          <a:bodyPr wrap="square" rtlCol="0">
+            <a:spAutoFit/>
+          </a:bodyPr>
+          <a:lstStyle/>
+          <a:p>
+            <a:r>
+              <a:rPr lang="en-GB" sz="1050" dirty="0">
+                <a:solidFill>
+                  <a:srgbClr val="FF0000"/>
+                </a:solidFill>
+              </a:rPr>
+              <a:t>Compute file CRC from this byte array</a:t>
+            </a:r>
+            <a:endParaRPr lang="fr-FR" sz="1050" dirty="0">
+              <a:solidFill>
+                <a:srgbClr val="FF0000"/>
+              </a:solidFill>
+            </a:endParaRPr>
+          </a:p>
+        </p:txBody>
+      </p:sp>
+      <p:cxnSp>
+        <p:nvCxnSpPr>
+          <p:cNvPr id="24" name="Straight Arrow Connector 13">
+            <a:extLst>
+              <a:ext uri="{FF2B5EF4-FFF2-40B4-BE49-F238E27FC236}">
+                <a16:creationId xmlns:a16="http://schemas.microsoft.com/office/drawing/2014/main" id="{BD021AB8-27F6-4F23-AF39-31B5AA2E9413}"/>
+              </a:ext>
+            </a:extLst>
+          </p:cNvPr>
+          <p:cNvCxnSpPr>
+            <a:cxnSpLocks/>
+            <a:stCxn id="23" idx="1"/>
+            <a:endCxn id="21" idx="3"/>
+          </p:cNvCxnSpPr>
+          <p:nvPr/>
+        </p:nvCxnSpPr>
+        <p:spPr>
+          <a:xfrm flipH="1">
+            <a:off x="7123897" y="3261041"/>
+            <a:ext cx="1197470" cy="297291"/>
+          </a:xfrm>
+          <a:prstGeom prst="straightConnector1">
+            <a:avLst/>
+          </a:prstGeom>
+          <a:ln>
+            <a:solidFill>
+              <a:srgbClr val="FF0000"/>
+            </a:solidFill>
+            <a:tailEnd type="triangle"/>
+          </a:ln>
+        </p:spPr>
+        <p:style>
+          <a:lnRef idx="1">
+            <a:schemeClr val="accent1"/>
+          </a:lnRef>
+          <a:fillRef idx="0">
+            <a:schemeClr val="accent1"/>
+          </a:fillRef>
+          <a:effectRef idx="0">
+            <a:schemeClr val="accent1"/>
+          </a:effectRef>
+          <a:fontRef idx="minor">
+            <a:schemeClr val="tx1"/>
+          </a:fontRef>
+        </p:style>
+      </p:cxnSp>
+    </p:spTree>
+    <p:extLst>
+      <p:ext uri="{BB962C8B-B14F-4D97-AF65-F5344CB8AC3E}">
+        <p14:creationId xmlns:p14="http://schemas.microsoft.com/office/powerpoint/2010/main" val="3919139246"/>
+      </p:ext>
+    </p:extLst>
+  </p:cSld>
+  <p:clrMapOvr>
+    <a:masterClrMapping/>
+  </p:clrMapOvr>
 </p:sld>
 </file>
 

</xml_diff>